<commit_message>
adapted slide: Next Steps
</commit_message>
<xml_diff>
--- a/presentations/ietf113-anima-jws-voucher.pptx
+++ b/presentations/ietf113-anima-jws-voucher.pptx
@@ -5959,7 +5959,7 @@
             </a:pPr>
             <a:r>
               <a:rPr lang="en-US" sz="2200" dirty="0"/>
-              <a:t>Further rework the draft (structure and application examples)</a:t>
+              <a:t>Further rework the draft (content, structure and examples)</a:t>
             </a:r>
           </a:p>
           <a:p>
@@ -5970,15 +5970,7 @@
             </a:pPr>
             <a:r>
               <a:rPr lang="en-US" sz="2200" dirty="0"/>
-              <a:t>Investigate 2</a:t>
-            </a:r>
-            <a:r>
-              <a:rPr lang="en-US" sz="2200" baseline="30000" dirty="0"/>
-              <a:t>nd</a:t>
-            </a:r>
-            <a:r>
-              <a:rPr lang="en-US" sz="2200" dirty="0"/>
-              <a:t> JWS serialization option </a:t>
+              <a:t>Alignment in BRSKI design team calls</a:t>
             </a:r>
           </a:p>
           <a:p>

</xml_diff>

<commit_message>
added slide with picture: "Voucher Representation in General JWS JSON Serialization Syntax"
</commit_message>
<xml_diff>
--- a/presentations/ietf113-anima-jws-voucher.pptx
+++ b/presentations/ietf113-anima-jws-voucher.pptx
@@ -5,15 +5,16 @@
     <p:sldMasterId id="2147483663" r:id="rId1"/>
   </p:sldMasterIdLst>
   <p:notesMasterIdLst>
-    <p:notesMasterId r:id="rId8"/>
+    <p:notesMasterId r:id="rId9"/>
   </p:notesMasterIdLst>
   <p:sldIdLst>
     <p:sldId id="256" r:id="rId2"/>
     <p:sldId id="300" r:id="rId3"/>
     <p:sldId id="302" r:id="rId4"/>
-    <p:sldId id="301" r:id="rId5"/>
-    <p:sldId id="285" r:id="rId6"/>
-    <p:sldId id="303" r:id="rId7"/>
+    <p:sldId id="304" r:id="rId5"/>
+    <p:sldId id="301" r:id="rId6"/>
+    <p:sldId id="285" r:id="rId7"/>
+    <p:sldId id="303" r:id="rId8"/>
   </p:sldIdLst>
   <p:sldSz cx="12192000" cy="6858000"/>
   <p:notesSz cx="6858000" cy="9144000"/>
@@ -228,7 +229,7 @@
           <a:p>
             <a:fld id="{33B5B5E8-CA78-4A82-83A0-867EF5A818AE}" type="datetimeFigureOut">
               <a:rPr lang="en-US" smtClean="0"/>
-              <a:t>3/3/2022</a:t>
+              <a:t>3/4/2022</a:t>
             </a:fld>
             <a:endParaRPr lang="en-US"/>
           </a:p>
@@ -737,7 +738,7 @@
     </p:spTree>
     <p:extLst>
       <p:ext uri="{BB962C8B-B14F-4D97-AF65-F5344CB8AC3E}">
-        <p14:creationId xmlns:p14="http://schemas.microsoft.com/office/powerpoint/2010/main" val="2425288104"/>
+        <p14:creationId xmlns:p14="http://schemas.microsoft.com/office/powerpoint/2010/main" val="3431314590"/>
       </p:ext>
     </p:extLst>
   </p:cSld>
@@ -821,7 +822,7 @@
     </p:spTree>
     <p:extLst>
       <p:ext uri="{BB962C8B-B14F-4D97-AF65-F5344CB8AC3E}">
-        <p14:creationId xmlns:p14="http://schemas.microsoft.com/office/powerpoint/2010/main" val="1926212273"/>
+        <p14:creationId xmlns:p14="http://schemas.microsoft.com/office/powerpoint/2010/main" val="2425288104"/>
       </p:ext>
     </p:extLst>
   </p:cSld>
@@ -897,6 +898,90 @@
             <a:fld id="{4C6D392E-C4EF-4AC5-9CF0-E17168E17BBE}" type="slidenum">
               <a:rPr lang="en-US" smtClean="0"/>
               <a:t>6</a:t>
+            </a:fld>
+            <a:endParaRPr lang="en-US"/>
+          </a:p>
+        </p:txBody>
+      </p:sp>
+    </p:spTree>
+    <p:extLst>
+      <p:ext uri="{BB962C8B-B14F-4D97-AF65-F5344CB8AC3E}">
+        <p14:creationId xmlns:p14="http://schemas.microsoft.com/office/powerpoint/2010/main" val="1926212273"/>
+      </p:ext>
+    </p:extLst>
+  </p:cSld>
+  <p:clrMapOvr>
+    <a:masterClrMapping/>
+  </p:clrMapOvr>
+</p:notes>
+</file>
+
+<file path=ppt/notesSlides/notesSlide6.xml><?xml version="1.0" encoding="utf-8"?>
+<p:notes xmlns:a="http://schemas.openxmlformats.org/drawingml/2006/main" xmlns:r="http://schemas.openxmlformats.org/officeDocument/2006/relationships" xmlns:p="http://schemas.openxmlformats.org/presentationml/2006/main">
+  <p:cSld>
+    <p:spTree>
+      <p:nvGrpSpPr>
+        <p:cNvPr id="1" name=""/>
+        <p:cNvGrpSpPr/>
+        <p:nvPr/>
+      </p:nvGrpSpPr>
+      <p:grpSpPr>
+        <a:xfrm>
+          <a:off x="0" y="0"/>
+          <a:ext cx="0" cy="0"/>
+          <a:chOff x="0" y="0"/>
+          <a:chExt cx="0" cy="0"/>
+        </a:xfrm>
+      </p:grpSpPr>
+      <p:sp>
+        <p:nvSpPr>
+          <p:cNvPr id="2" name="Slide Image Placeholder 1"/>
+          <p:cNvSpPr>
+            <a:spLocks noGrp="1" noRot="1" noChangeAspect="1"/>
+          </p:cNvSpPr>
+          <p:nvPr>
+            <p:ph type="sldImg"/>
+          </p:nvPr>
+        </p:nvSpPr>
+        <p:spPr/>
+      </p:sp>
+      <p:sp>
+        <p:nvSpPr>
+          <p:cNvPr id="3" name="Notes Placeholder 2"/>
+          <p:cNvSpPr>
+            <a:spLocks noGrp="1"/>
+          </p:cNvSpPr>
+          <p:nvPr>
+            <p:ph type="body" idx="1"/>
+          </p:nvPr>
+        </p:nvSpPr>
+        <p:spPr/>
+        <p:txBody>
+          <a:bodyPr/>
+          <a:lstStyle/>
+          <a:p>
+            <a:endParaRPr lang="en-US" dirty="0"/>
+          </a:p>
+        </p:txBody>
+      </p:sp>
+      <p:sp>
+        <p:nvSpPr>
+          <p:cNvPr id="4" name="Slide Number Placeholder 3"/>
+          <p:cNvSpPr>
+            <a:spLocks noGrp="1"/>
+          </p:cNvSpPr>
+          <p:nvPr>
+            <p:ph type="sldNum" sz="quarter" idx="5"/>
+          </p:nvPr>
+        </p:nvSpPr>
+        <p:spPr/>
+        <p:txBody>
+          <a:bodyPr/>
+          <a:lstStyle/>
+          <a:p>
+            <a:fld id="{4C6D392E-C4EF-4AC5-9CF0-E17168E17BBE}" type="slidenum">
+              <a:rPr lang="en-US" smtClean="0"/>
+              <a:t>7</a:t>
             </a:fld>
             <a:endParaRPr lang="en-US"/>
           </a:p>
@@ -1070,7 +1155,7 @@
           <a:p>
             <a:fld id="{8C792E63-5F21-4F54-A864-D84D9F273FCA}" type="datetimeFigureOut">
               <a:rPr lang="en-US" smtClean="0"/>
-              <a:t>3/3/2022</a:t>
+              <a:t>3/4/2022</a:t>
             </a:fld>
             <a:endParaRPr lang="en-US" dirty="0"/>
           </a:p>
@@ -1288,7 +1373,7 @@
           <a:p>
             <a:fld id="{8C792E63-5F21-4F54-A864-D84D9F273FCA}" type="datetimeFigureOut">
               <a:rPr lang="en-US" smtClean="0"/>
-              <a:t>3/3/2022</a:t>
+              <a:t>3/4/2022</a:t>
             </a:fld>
             <a:endParaRPr lang="en-US"/>
           </a:p>
@@ -1512,7 +1597,7 @@
           <a:p>
             <a:fld id="{8C792E63-5F21-4F54-A864-D84D9F273FCA}" type="datetimeFigureOut">
               <a:rPr lang="en-US" smtClean="0"/>
-              <a:t>3/3/2022</a:t>
+              <a:t>3/4/2022</a:t>
             </a:fld>
             <a:endParaRPr lang="en-US"/>
           </a:p>
@@ -1726,7 +1811,7 @@
           <a:p>
             <a:fld id="{8C792E63-5F21-4F54-A864-D84D9F273FCA}" type="datetimeFigureOut">
               <a:rPr lang="en-US" smtClean="0"/>
-              <a:t>3/3/2022</a:t>
+              <a:t>3/4/2022</a:t>
             </a:fld>
             <a:endParaRPr lang="en-US"/>
           </a:p>
@@ -2017,7 +2102,7 @@
           <a:p>
             <a:fld id="{8C792E63-5F21-4F54-A864-D84D9F273FCA}" type="datetimeFigureOut">
               <a:rPr lang="en-US" smtClean="0"/>
-              <a:t>3/3/2022</a:t>
+              <a:t>3/4/2022</a:t>
             </a:fld>
             <a:endParaRPr lang="en-US"/>
           </a:p>
@@ -2298,7 +2383,7 @@
           <a:p>
             <a:fld id="{8C792E63-5F21-4F54-A864-D84D9F273FCA}" type="datetimeFigureOut">
               <a:rPr lang="en-US" smtClean="0"/>
-              <a:t>3/3/2022</a:t>
+              <a:t>3/4/2022</a:t>
             </a:fld>
             <a:endParaRPr lang="en-US"/>
           </a:p>
@@ -2726,7 +2811,7 @@
           <a:p>
             <a:fld id="{8C792E63-5F21-4F54-A864-D84D9F273FCA}" type="datetimeFigureOut">
               <a:rPr lang="en-US" smtClean="0"/>
-              <a:t>3/3/2022</a:t>
+              <a:t>3/4/2022</a:t>
             </a:fld>
             <a:endParaRPr lang="en-US"/>
           </a:p>
@@ -2883,7 +2968,7 @@
           <a:p>
             <a:fld id="{8C792E63-5F21-4F54-A864-D84D9F273FCA}" type="datetimeFigureOut">
               <a:rPr lang="en-US" smtClean="0"/>
-              <a:t>3/3/2022</a:t>
+              <a:t>3/4/2022</a:t>
             </a:fld>
             <a:endParaRPr lang="en-US"/>
           </a:p>
@@ -3012,7 +3097,7 @@
           <a:p>
             <a:fld id="{8C792E63-5F21-4F54-A864-D84D9F273FCA}" type="datetimeFigureOut">
               <a:rPr lang="en-US" smtClean="0"/>
-              <a:t>3/3/2022</a:t>
+              <a:t>3/4/2022</a:t>
             </a:fld>
             <a:endParaRPr lang="en-US"/>
           </a:p>
@@ -3339,7 +3424,7 @@
           <a:p>
             <a:fld id="{8C792E63-5F21-4F54-A864-D84D9F273FCA}" type="datetimeFigureOut">
               <a:rPr lang="en-US" smtClean="0"/>
-              <a:t>3/3/2022</a:t>
+              <a:t>3/4/2022</a:t>
             </a:fld>
             <a:endParaRPr lang="en-US"/>
           </a:p>
@@ -3643,7 +3728,7 @@
           <a:p>
             <a:fld id="{8C792E63-5F21-4F54-A864-D84D9F273FCA}" type="datetimeFigureOut">
               <a:rPr lang="en-US" smtClean="0"/>
-              <a:t>3/3/2022</a:t>
+              <a:t>3/4/2022</a:t>
             </a:fld>
             <a:endParaRPr lang="en-US"/>
           </a:p>
@@ -3935,7 +4020,7 @@
           <a:p>
             <a:fld id="{8C792E63-5F21-4F54-A864-D84D9F273FCA}" type="datetimeFigureOut">
               <a:rPr lang="en-US" smtClean="0"/>
-              <a:t>3/3/2022</a:t>
+              <a:t>3/4/2022</a:t>
             </a:fld>
             <a:endParaRPr lang="en-US"/>
           </a:p>
@@ -4715,7 +4800,7 @@
             <a:fld id="{8C792E63-5F21-4F54-A864-D84D9F273FCA}" type="datetimeFigureOut">
               <a:rPr lang="en-US" smtClean="0"/>
               <a:pPr/>
-              <a:t>3/3/2022</a:t>
+              <a:t>3/4/2022</a:t>
             </a:fld>
             <a:endParaRPr lang="en-US"/>
           </a:p>
@@ -5187,7 +5272,7 @@
             </a:pPr>
             <a:r>
               <a:rPr lang="en-US" sz="1800" dirty="0"/>
-              <a:t>should support same feature set as other Voucher forms, without limitation</a:t>
+              <a:t>should support same feature set as other Voucher forms (e.g. JSON-in-CMS), without limitation</a:t>
             </a:r>
           </a:p>
         </p:txBody>
@@ -5318,7 +5403,7 @@
             <a:fld id="{8C792E63-5F21-4F54-A864-D84D9F273FCA}" type="datetimeFigureOut">
               <a:rPr lang="en-US" smtClean="0"/>
               <a:pPr/>
-              <a:t>3/3/2022</a:t>
+              <a:t>3/4/2022</a:t>
             </a:fld>
             <a:endParaRPr lang="en-US" dirty="0"/>
           </a:p>
@@ -5502,100 +5587,25 @@
             <p:ph type="title"/>
           </p:nvPr>
         </p:nvSpPr>
-        <p:spPr>
-          <a:xfrm>
-            <a:off x="838200" y="539300"/>
-            <a:ext cx="10515600" cy="1325563"/>
-          </a:xfrm>
-        </p:spPr>
+        <p:spPr/>
         <p:txBody>
           <a:bodyPr>
-            <a:noAutofit/>
+            <a:normAutofit/>
           </a:bodyPr>
           <a:lstStyle/>
           <a:p>
             <a:pPr algn="ctr"/>
             <a:r>
               <a:rPr lang="en-US" sz="3600" b="1" dirty="0"/>
-              <a:t>History of changes - draft-ietf-anima-jws-voucher-02</a:t>
-            </a:r>
-          </a:p>
-        </p:txBody>
-      </p:sp>
-      <p:sp>
-        <p:nvSpPr>
-          <p:cNvPr id="3" name="Content Placeholder 2">
-            <a:extLst>
-              <a:ext uri="{FF2B5EF4-FFF2-40B4-BE49-F238E27FC236}">
-                <a16:creationId xmlns:a16="http://schemas.microsoft.com/office/drawing/2014/main" id="{A9776AB7-EF6B-4831-BA5E-A2298E1B08F8}"/>
-              </a:ext>
-            </a:extLst>
-          </p:cNvPr>
-          <p:cNvSpPr>
-            <a:spLocks noGrp="1"/>
-          </p:cNvSpPr>
-          <p:nvPr>
-            <p:ph idx="1"/>
-          </p:nvPr>
-        </p:nvSpPr>
-        <p:spPr>
-          <a:xfrm>
-            <a:off x="838200" y="2591984"/>
-            <a:ext cx="10515600" cy="3042466"/>
-          </a:xfrm>
-        </p:spPr>
-        <p:txBody>
-          <a:bodyPr>
-            <a:noAutofit/>
-          </a:bodyPr>
-          <a:lstStyle/>
-          <a:p>
-            <a:pPr>
-              <a:lnSpc>
-                <a:spcPct val="100000"/>
-              </a:lnSpc>
-            </a:pPr>
-            <a:r>
-              <a:rPr lang="en-US" sz="2200" dirty="0"/>
-              <a:t>Mainly switch from “JWS Compact Serialization” to “General JWS JSON Serialization” </a:t>
-            </a:r>
-          </a:p>
-          <a:p>
-            <a:pPr marL="457200" lvl="1" indent="0">
-              <a:lnSpc>
-                <a:spcPct val="100000"/>
-              </a:lnSpc>
-              <a:buNone/>
-            </a:pPr>
-            <a:endParaRPr lang="en-US" sz="1800" dirty="0"/>
-          </a:p>
-          <a:p>
-            <a:pPr marL="457200" lvl="1" indent="0">
-              <a:lnSpc>
-                <a:spcPct val="100000"/>
-              </a:lnSpc>
-              <a:buNone/>
-            </a:pPr>
-            <a:endParaRPr lang="en-US" sz="1800" dirty="0"/>
-          </a:p>
-          <a:p>
-            <a:pPr>
-              <a:lnSpc>
-                <a:spcPct val="100000"/>
-              </a:lnSpc>
-            </a:pPr>
-            <a:r>
-              <a:rPr lang="en-US" sz="2200" dirty="0"/>
-              <a:t>Include syntax and examples for Voucher request and response objects (PVR, RVR, Voucher)</a:t>
-            </a:r>
-          </a:p>
-          <a:p>
-            <a:pPr>
-              <a:lnSpc>
-                <a:spcPct val="100000"/>
-              </a:lnSpc>
-            </a:pPr>
-            <a:endParaRPr lang="en-US" sz="2200" dirty="0"/>
+              <a:t>Voucher Representation</a:t>
+            </a:r>
+            <a:br>
+              <a:rPr lang="en-US" sz="3600" b="1" dirty="0"/>
+            </a:br>
+            <a:r>
+              <a:rPr lang="en-US" sz="3600" b="1" dirty="0"/>
+              <a:t>General JWS JSON Serialization Syntax</a:t>
+            </a:r>
           </a:p>
         </p:txBody>
       </p:sp>
@@ -5725,7 +5735,7 @@
             <a:fld id="{8C792E63-5F21-4F54-A864-D84D9F273FCA}" type="datetimeFigureOut">
               <a:rPr lang="en-US" smtClean="0"/>
               <a:pPr/>
-              <a:t>3/3/2022</a:t>
+              <a:t>3/4/2022</a:t>
             </a:fld>
             <a:endParaRPr lang="en-US" dirty="0"/>
           </a:p>
@@ -5863,10 +5873,40 @@
           </a:p>
         </p:txBody>
       </p:sp>
+      <p:pic>
+        <p:nvPicPr>
+          <p:cNvPr id="7" name="Picture 6">
+            <a:extLst>
+              <a:ext uri="{FF2B5EF4-FFF2-40B4-BE49-F238E27FC236}">
+                <a16:creationId xmlns:a16="http://schemas.microsoft.com/office/drawing/2014/main" id="{3B6AAB72-327F-4C01-8ACB-A29BBCAE08FB}"/>
+              </a:ext>
+            </a:extLst>
+          </p:cNvPr>
+          <p:cNvPicPr>
+            <a:picLocks noChangeAspect="1"/>
+          </p:cNvPicPr>
+          <p:nvPr/>
+        </p:nvPicPr>
+        <p:blipFill>
+          <a:blip r:embed="rId3"/>
+          <a:stretch>
+            <a:fillRect/>
+          </a:stretch>
+        </p:blipFill>
+        <p:spPr>
+          <a:xfrm>
+            <a:off x="2763672" y="1519514"/>
+            <a:ext cx="6631342" cy="4779346"/>
+          </a:xfrm>
+          <a:prstGeom prst="rect">
+            <a:avLst/>
+          </a:prstGeom>
+        </p:spPr>
+      </p:pic>
     </p:spTree>
     <p:extLst>
       <p:ext uri="{BB962C8B-B14F-4D97-AF65-F5344CB8AC3E}">
-        <p14:creationId xmlns:p14="http://schemas.microsoft.com/office/powerpoint/2010/main" val="135180077"/>
+        <p14:creationId xmlns:p14="http://schemas.microsoft.com/office/powerpoint/2010/main" val="1297370585"/>
       </p:ext>
     </p:extLst>
   </p:cSld>
@@ -5909,17 +5949,22 @@
             <p:ph type="title"/>
           </p:nvPr>
         </p:nvSpPr>
-        <p:spPr/>
+        <p:spPr>
+          <a:xfrm>
+            <a:off x="838200" y="539300"/>
+            <a:ext cx="10515600" cy="1325563"/>
+          </a:xfrm>
+        </p:spPr>
         <p:txBody>
           <a:bodyPr>
-            <a:normAutofit/>
+            <a:noAutofit/>
           </a:bodyPr>
           <a:lstStyle/>
           <a:p>
             <a:pPr algn="ctr"/>
             <a:r>
               <a:rPr lang="en-US" sz="3600" b="1" dirty="0"/>
-              <a:t>JWS Voucher - Next Steps</a:t>
+              <a:t>History of changes - draft-ietf-anima-jws-voucher-02</a:t>
             </a:r>
           </a:p>
         </p:txBody>
@@ -5942,8 +5987,8 @@
         </p:nvSpPr>
         <p:spPr>
           <a:xfrm>
-            <a:off x="701640" y="1727149"/>
-            <a:ext cx="10515600" cy="3611206"/>
+            <a:off x="838200" y="2591984"/>
+            <a:ext cx="10515600" cy="3042466"/>
           </a:xfrm>
         </p:spPr>
         <p:txBody>
@@ -5959,8 +6004,26 @@
             </a:pPr>
             <a:r>
               <a:rPr lang="en-US" sz="2200" dirty="0"/>
-              <a:t>Further rework the draft (content, structure and examples)</a:t>
-            </a:r>
+              <a:t>Mainly switch from “JWS Compact Serialization” to “General JWS JSON Serialization” </a:t>
+            </a:r>
+          </a:p>
+          <a:p>
+            <a:pPr marL="457200" lvl="1" indent="0">
+              <a:lnSpc>
+                <a:spcPct val="100000"/>
+              </a:lnSpc>
+              <a:buNone/>
+            </a:pPr>
+            <a:endParaRPr lang="en-US" sz="1800" dirty="0"/>
+          </a:p>
+          <a:p>
+            <a:pPr marL="457200" lvl="1" indent="0">
+              <a:lnSpc>
+                <a:spcPct val="100000"/>
+              </a:lnSpc>
+              <a:buNone/>
+            </a:pPr>
+            <a:endParaRPr lang="en-US" sz="1800" dirty="0"/>
           </a:p>
           <a:p>
             <a:pPr>
@@ -5970,7 +6033,14 @@
             </a:pPr>
             <a:r>
               <a:rPr lang="en-US" sz="2200" dirty="0"/>
-              <a:t>Alignment in BRSKI design team calls</a:t>
+              <a:t>Include syntax and examples for Voucher request and response objects </a:t>
+            </a:r>
+            <a:br>
+              <a:rPr lang="en-US" sz="2200" dirty="0"/>
+            </a:br>
+            <a:r>
+              <a:rPr lang="en-US" sz="2200" dirty="0"/>
+              <a:t>(PVR, RVR, Voucher)</a:t>
             </a:r>
           </a:p>
           <a:p>
@@ -5979,40 +6049,6 @@
                 <a:spcPct val="100000"/>
               </a:lnSpc>
             </a:pPr>
-            <a:r>
-              <a:rPr lang="en-US" sz="2200" dirty="0"/>
-              <a:t>Circulate outcome on the mailing list for further discussion</a:t>
-            </a:r>
-          </a:p>
-          <a:p>
-            <a:pPr>
-              <a:lnSpc>
-                <a:spcPct val="100000"/>
-              </a:lnSpc>
-            </a:pPr>
-            <a:r>
-              <a:rPr lang="en-US" sz="2200" dirty="0"/>
-              <a:t>PoC implementation and interop in combination with BRSKI-PRM</a:t>
-            </a:r>
-          </a:p>
-          <a:p>
-            <a:pPr>
-              <a:lnSpc>
-                <a:spcPct val="100000"/>
-              </a:lnSpc>
-            </a:pPr>
-            <a:r>
-              <a:rPr lang="en-US" sz="2200" dirty="0"/>
-              <a:t>WG review appreciated</a:t>
-            </a:r>
-          </a:p>
-          <a:p>
-            <a:pPr marL="0" indent="0">
-              <a:lnSpc>
-                <a:spcPct val="100000"/>
-              </a:lnSpc>
-              <a:buNone/>
-            </a:pPr>
             <a:endParaRPr lang="en-US" sz="2200" dirty="0"/>
           </a:p>
         </p:txBody>
@@ -6022,7 +6058,7 @@
           <p:cNvPr id="4" name="Date Placeholder 3">
             <a:extLst>
               <a:ext uri="{FF2B5EF4-FFF2-40B4-BE49-F238E27FC236}">
-                <a16:creationId xmlns:a16="http://schemas.microsoft.com/office/drawing/2014/main" id="{3B57BFE0-8AA2-440A-BF11-3DDE98998EE8}"/>
+                <a16:creationId xmlns:a16="http://schemas.microsoft.com/office/drawing/2014/main" id="{603A4F89-D37F-47CD-A5DD-8B1F7476D4B1}"/>
               </a:ext>
             </a:extLst>
           </p:cNvPr>
@@ -6033,7 +6069,7 @@
         </p:nvSpPr>
         <p:spPr>
           <a:xfrm>
-            <a:off x="990600" y="6508750"/>
+            <a:off x="838200" y="6356350"/>
             <a:ext cx="2743200" cy="365125"/>
           </a:xfrm>
           <a:prstGeom prst="rect">
@@ -6143,7 +6179,7 @@
             <a:fld id="{8C792E63-5F21-4F54-A864-D84D9F273FCA}" type="datetimeFigureOut">
               <a:rPr lang="en-US" smtClean="0"/>
               <a:pPr/>
-              <a:t>3/3/2022</a:t>
+              <a:t>3/4/2022</a:t>
             </a:fld>
             <a:endParaRPr lang="en-US" dirty="0"/>
           </a:p>
@@ -6154,7 +6190,7 @@
           <p:cNvPr id="5" name="Slide Number Placeholder 5">
             <a:extLst>
               <a:ext uri="{FF2B5EF4-FFF2-40B4-BE49-F238E27FC236}">
-                <a16:creationId xmlns:a16="http://schemas.microsoft.com/office/drawing/2014/main" id="{1881EAE9-7681-4485-81EC-EAB026A81A3C}"/>
+                <a16:creationId xmlns:a16="http://schemas.microsoft.com/office/drawing/2014/main" id="{EA009C1A-0CD0-4840-856B-B85603FEF6D0}"/>
               </a:ext>
             </a:extLst>
           </p:cNvPr>
@@ -6165,7 +6201,7 @@
         </p:nvSpPr>
         <p:spPr>
           <a:xfrm>
-            <a:off x="8763000" y="6508750"/>
+            <a:off x="8610600" y="6356350"/>
             <a:ext cx="2743200" cy="365125"/>
           </a:xfrm>
           <a:prstGeom prst="rect">
@@ -6281,70 +6317,10 @@
           </a:p>
         </p:txBody>
       </p:sp>
-      <p:sp>
-        <p:nvSpPr>
-          <p:cNvPr id="6" name="TextBox 5">
-            <a:extLst>
-              <a:ext uri="{FF2B5EF4-FFF2-40B4-BE49-F238E27FC236}">
-                <a16:creationId xmlns:a16="http://schemas.microsoft.com/office/drawing/2014/main" id="{687A746C-1A8B-4BDF-9F72-67F3F3093D7B}"/>
-              </a:ext>
-            </a:extLst>
-          </p:cNvPr>
-          <p:cNvSpPr txBox="1"/>
-          <p:nvPr/>
-        </p:nvSpPr>
-        <p:spPr>
-          <a:xfrm>
-            <a:off x="1680754" y="5860959"/>
-            <a:ext cx="10189818" cy="307777"/>
-          </a:xfrm>
-          <a:prstGeom prst="rect">
-            <a:avLst/>
-          </a:prstGeom>
-          <a:noFill/>
-        </p:spPr>
-        <p:txBody>
-          <a:bodyPr wrap="square" rtlCol="0">
-            <a:spAutoFit/>
-          </a:bodyPr>
-          <a:lstStyle/>
-          <a:p>
-            <a:pPr algn="r"/>
-            <a:r>
-              <a:rPr lang="de-DE" sz="1400" dirty="0"/>
-              <a:t>BRSKI-PRM: </a:t>
-            </a:r>
-            <a:r>
-              <a:rPr lang="en-US" sz="1400" dirty="0"/>
-              <a:t>BRSKI with Pledge in Responder Mode</a:t>
-            </a:r>
-            <a:r>
-              <a:rPr lang="de-DE" sz="1400" dirty="0"/>
-              <a:t> (draft-</a:t>
-            </a:r>
-            <a:r>
-              <a:rPr lang="de-DE" sz="1400" dirty="0" err="1"/>
-              <a:t>ietf</a:t>
-            </a:r>
-            <a:r>
-              <a:rPr lang="de-DE" sz="1400" dirty="0"/>
-              <a:t>-</a:t>
-            </a:r>
-            <a:r>
-              <a:rPr lang="de-DE" sz="1400" dirty="0" err="1"/>
-              <a:t>anima-brski-prm</a:t>
-            </a:r>
-            <a:r>
-              <a:rPr lang="de-DE" sz="1400" dirty="0"/>
-              <a:t>)</a:t>
-            </a:r>
-          </a:p>
-        </p:txBody>
-      </p:sp>
     </p:spTree>
     <p:extLst>
       <p:ext uri="{BB962C8B-B14F-4D97-AF65-F5344CB8AC3E}">
-        <p14:creationId xmlns:p14="http://schemas.microsoft.com/office/powerpoint/2010/main" val="3091934840"/>
+        <p14:creationId xmlns:p14="http://schemas.microsoft.com/office/powerpoint/2010/main" val="135180077"/>
       </p:ext>
     </p:extLst>
   </p:cSld>
@@ -6387,6 +6363,484 @@
             <p:ph type="title"/>
           </p:nvPr>
         </p:nvSpPr>
+        <p:spPr/>
+        <p:txBody>
+          <a:bodyPr>
+            <a:normAutofit/>
+          </a:bodyPr>
+          <a:lstStyle/>
+          <a:p>
+            <a:pPr algn="ctr"/>
+            <a:r>
+              <a:rPr lang="en-US" sz="3600" b="1" dirty="0"/>
+              <a:t>JWS Voucher - Next Steps</a:t>
+            </a:r>
+          </a:p>
+        </p:txBody>
+      </p:sp>
+      <p:sp>
+        <p:nvSpPr>
+          <p:cNvPr id="3" name="Content Placeholder 2">
+            <a:extLst>
+              <a:ext uri="{FF2B5EF4-FFF2-40B4-BE49-F238E27FC236}">
+                <a16:creationId xmlns:a16="http://schemas.microsoft.com/office/drawing/2014/main" id="{A9776AB7-EF6B-4831-BA5E-A2298E1B08F8}"/>
+              </a:ext>
+            </a:extLst>
+          </p:cNvPr>
+          <p:cNvSpPr>
+            <a:spLocks noGrp="1"/>
+          </p:cNvSpPr>
+          <p:nvPr>
+            <p:ph idx="1"/>
+          </p:nvPr>
+        </p:nvSpPr>
+        <p:spPr>
+          <a:xfrm>
+            <a:off x="701640" y="1727149"/>
+            <a:ext cx="10515600" cy="3611206"/>
+          </a:xfrm>
+        </p:spPr>
+        <p:txBody>
+          <a:bodyPr>
+            <a:noAutofit/>
+          </a:bodyPr>
+          <a:lstStyle/>
+          <a:p>
+            <a:pPr>
+              <a:lnSpc>
+                <a:spcPct val="100000"/>
+              </a:lnSpc>
+            </a:pPr>
+            <a:r>
+              <a:rPr lang="en-US" sz="2200" dirty="0"/>
+              <a:t>Further enhance description of “General JWS JSON Serialization”</a:t>
+            </a:r>
+          </a:p>
+          <a:p>
+            <a:pPr>
+              <a:lnSpc>
+                <a:spcPct val="100000"/>
+              </a:lnSpc>
+            </a:pPr>
+            <a:r>
+              <a:rPr lang="en-US" sz="2200" dirty="0"/>
+              <a:t>Alignment in BRSKI design team calls</a:t>
+            </a:r>
+          </a:p>
+          <a:p>
+            <a:pPr>
+              <a:lnSpc>
+                <a:spcPct val="100000"/>
+              </a:lnSpc>
+            </a:pPr>
+            <a:r>
+              <a:rPr lang="en-US" sz="2200" dirty="0"/>
+              <a:t>Circulate outcome on the mailing list for further discussion</a:t>
+            </a:r>
+          </a:p>
+          <a:p>
+            <a:pPr>
+              <a:lnSpc>
+                <a:spcPct val="100000"/>
+              </a:lnSpc>
+            </a:pPr>
+            <a:r>
+              <a:rPr lang="en-US" sz="2200" dirty="0"/>
+              <a:t>PoC implementation and interop in combination with BRSKI-PRM</a:t>
+            </a:r>
+          </a:p>
+          <a:p>
+            <a:pPr>
+              <a:lnSpc>
+                <a:spcPct val="100000"/>
+              </a:lnSpc>
+            </a:pPr>
+            <a:r>
+              <a:rPr lang="en-US" sz="2200" dirty="0"/>
+              <a:t>WG review appreciated</a:t>
+            </a:r>
+          </a:p>
+          <a:p>
+            <a:pPr marL="0" indent="0">
+              <a:lnSpc>
+                <a:spcPct val="100000"/>
+              </a:lnSpc>
+              <a:buNone/>
+            </a:pPr>
+            <a:endParaRPr lang="en-US" sz="2200" dirty="0"/>
+          </a:p>
+        </p:txBody>
+      </p:sp>
+      <p:sp>
+        <p:nvSpPr>
+          <p:cNvPr id="4" name="Date Placeholder 3">
+            <a:extLst>
+              <a:ext uri="{FF2B5EF4-FFF2-40B4-BE49-F238E27FC236}">
+                <a16:creationId xmlns:a16="http://schemas.microsoft.com/office/drawing/2014/main" id="{3B57BFE0-8AA2-440A-BF11-3DDE98998EE8}"/>
+              </a:ext>
+            </a:extLst>
+          </p:cNvPr>
+          <p:cNvSpPr txBox="1">
+            <a:spLocks/>
+          </p:cNvSpPr>
+          <p:nvPr/>
+        </p:nvSpPr>
+        <p:spPr>
+          <a:xfrm>
+            <a:off x="990600" y="6508750"/>
+            <a:ext cx="2743200" cy="365125"/>
+          </a:xfrm>
+          <a:prstGeom prst="rect">
+            <a:avLst/>
+          </a:prstGeom>
+        </p:spPr>
+        <p:txBody>
+          <a:bodyPr vert="horz" lIns="91440" tIns="45720" rIns="91440" bIns="45720" rtlCol="0" anchor="ctr"/>
+          <a:lstStyle>
+            <a:defPPr>
+              <a:defRPr lang="de-DE"/>
+            </a:defPPr>
+            <a:lvl1pPr marL="0" algn="l" defTabSz="914400" rtl="0" eaLnBrk="1" latinLnBrk="0" hangingPunct="1">
+              <a:defRPr sz="1200" kern="1200">
+                <a:solidFill>
+                  <a:schemeClr val="tx1">
+                    <a:tint val="75000"/>
+                  </a:schemeClr>
+                </a:solidFill>
+                <a:latin typeface="+mn-lt"/>
+                <a:ea typeface="+mn-ea"/>
+                <a:cs typeface="+mn-cs"/>
+              </a:defRPr>
+            </a:lvl1pPr>
+            <a:lvl2pPr marL="457200" algn="l" defTabSz="914400" rtl="0" eaLnBrk="1" latinLnBrk="0" hangingPunct="1">
+              <a:defRPr sz="1800" kern="1200">
+                <a:solidFill>
+                  <a:schemeClr val="tx1"/>
+                </a:solidFill>
+                <a:latin typeface="+mn-lt"/>
+                <a:ea typeface="+mn-ea"/>
+                <a:cs typeface="+mn-cs"/>
+              </a:defRPr>
+            </a:lvl2pPr>
+            <a:lvl3pPr marL="914400" algn="l" defTabSz="914400" rtl="0" eaLnBrk="1" latinLnBrk="0" hangingPunct="1">
+              <a:defRPr sz="1800" kern="1200">
+                <a:solidFill>
+                  <a:schemeClr val="tx1"/>
+                </a:solidFill>
+                <a:latin typeface="+mn-lt"/>
+                <a:ea typeface="+mn-ea"/>
+                <a:cs typeface="+mn-cs"/>
+              </a:defRPr>
+            </a:lvl3pPr>
+            <a:lvl4pPr marL="1371600" algn="l" defTabSz="914400" rtl="0" eaLnBrk="1" latinLnBrk="0" hangingPunct="1">
+              <a:defRPr sz="1800" kern="1200">
+                <a:solidFill>
+                  <a:schemeClr val="tx1"/>
+                </a:solidFill>
+                <a:latin typeface="+mn-lt"/>
+                <a:ea typeface="+mn-ea"/>
+                <a:cs typeface="+mn-cs"/>
+              </a:defRPr>
+            </a:lvl4pPr>
+            <a:lvl5pPr marL="1828800" algn="l" defTabSz="914400" rtl="0" eaLnBrk="1" latinLnBrk="0" hangingPunct="1">
+              <a:defRPr sz="1800" kern="1200">
+                <a:solidFill>
+                  <a:schemeClr val="tx1"/>
+                </a:solidFill>
+                <a:latin typeface="+mn-lt"/>
+                <a:ea typeface="+mn-ea"/>
+                <a:cs typeface="+mn-cs"/>
+              </a:defRPr>
+            </a:lvl5pPr>
+            <a:lvl6pPr marL="2286000" algn="l" defTabSz="914400" rtl="0" eaLnBrk="1" latinLnBrk="0" hangingPunct="1">
+              <a:defRPr sz="1800" kern="1200">
+                <a:solidFill>
+                  <a:schemeClr val="tx1"/>
+                </a:solidFill>
+                <a:latin typeface="+mn-lt"/>
+                <a:ea typeface="+mn-ea"/>
+                <a:cs typeface="+mn-cs"/>
+              </a:defRPr>
+            </a:lvl6pPr>
+            <a:lvl7pPr marL="2743200" algn="l" defTabSz="914400" rtl="0" eaLnBrk="1" latinLnBrk="0" hangingPunct="1">
+              <a:defRPr sz="1800" kern="1200">
+                <a:solidFill>
+                  <a:schemeClr val="tx1"/>
+                </a:solidFill>
+                <a:latin typeface="+mn-lt"/>
+                <a:ea typeface="+mn-ea"/>
+                <a:cs typeface="+mn-cs"/>
+              </a:defRPr>
+            </a:lvl7pPr>
+            <a:lvl8pPr marL="3200400" algn="l" defTabSz="914400" rtl="0" eaLnBrk="1" latinLnBrk="0" hangingPunct="1">
+              <a:defRPr sz="1800" kern="1200">
+                <a:solidFill>
+                  <a:schemeClr val="tx1"/>
+                </a:solidFill>
+                <a:latin typeface="+mn-lt"/>
+                <a:ea typeface="+mn-ea"/>
+                <a:cs typeface="+mn-cs"/>
+              </a:defRPr>
+            </a:lvl8pPr>
+            <a:lvl9pPr marL="3657600" algn="l" defTabSz="914400" rtl="0" eaLnBrk="1" latinLnBrk="0" hangingPunct="1">
+              <a:defRPr sz="1800" kern="1200">
+                <a:solidFill>
+                  <a:schemeClr val="tx1"/>
+                </a:solidFill>
+                <a:latin typeface="+mn-lt"/>
+                <a:ea typeface="+mn-ea"/>
+                <a:cs typeface="+mn-cs"/>
+              </a:defRPr>
+            </a:lvl9pPr>
+          </a:lstStyle>
+          <a:p>
+            <a:fld id="{8C792E63-5F21-4F54-A864-D84D9F273FCA}" type="datetimeFigureOut">
+              <a:rPr lang="en-US" smtClean="0"/>
+              <a:pPr/>
+              <a:t>3/4/2022</a:t>
+            </a:fld>
+            <a:endParaRPr lang="en-US" dirty="0"/>
+          </a:p>
+        </p:txBody>
+      </p:sp>
+      <p:sp>
+        <p:nvSpPr>
+          <p:cNvPr id="5" name="Slide Number Placeholder 5">
+            <a:extLst>
+              <a:ext uri="{FF2B5EF4-FFF2-40B4-BE49-F238E27FC236}">
+                <a16:creationId xmlns:a16="http://schemas.microsoft.com/office/drawing/2014/main" id="{1881EAE9-7681-4485-81EC-EAB026A81A3C}"/>
+              </a:ext>
+            </a:extLst>
+          </p:cNvPr>
+          <p:cNvSpPr txBox="1">
+            <a:spLocks/>
+          </p:cNvSpPr>
+          <p:nvPr/>
+        </p:nvSpPr>
+        <p:spPr>
+          <a:xfrm>
+            <a:off x="8763000" y="6508750"/>
+            <a:ext cx="2743200" cy="365125"/>
+          </a:xfrm>
+          <a:prstGeom prst="rect">
+            <a:avLst/>
+          </a:prstGeom>
+        </p:spPr>
+        <p:txBody>
+          <a:bodyPr vert="horz" lIns="91440" tIns="45720" rIns="91440" bIns="45720" rtlCol="0" anchor="ctr"/>
+          <a:lstStyle>
+            <a:defPPr>
+              <a:defRPr lang="de-DE"/>
+            </a:defPPr>
+            <a:lvl1pPr marL="0" algn="r" defTabSz="914400" rtl="0" eaLnBrk="1" latinLnBrk="0" hangingPunct="1">
+              <a:defRPr sz="1200" kern="1200">
+                <a:solidFill>
+                  <a:schemeClr val="tx1">
+                    <a:tint val="75000"/>
+                  </a:schemeClr>
+                </a:solidFill>
+                <a:latin typeface="+mn-lt"/>
+                <a:ea typeface="+mn-ea"/>
+                <a:cs typeface="+mn-cs"/>
+              </a:defRPr>
+            </a:lvl1pPr>
+            <a:lvl2pPr marL="457200" algn="l" defTabSz="914400" rtl="0" eaLnBrk="1" latinLnBrk="0" hangingPunct="1">
+              <a:defRPr sz="1800" kern="1200">
+                <a:solidFill>
+                  <a:schemeClr val="tx1"/>
+                </a:solidFill>
+                <a:latin typeface="+mn-lt"/>
+                <a:ea typeface="+mn-ea"/>
+                <a:cs typeface="+mn-cs"/>
+              </a:defRPr>
+            </a:lvl2pPr>
+            <a:lvl3pPr marL="914400" algn="l" defTabSz="914400" rtl="0" eaLnBrk="1" latinLnBrk="0" hangingPunct="1">
+              <a:defRPr sz="1800" kern="1200">
+                <a:solidFill>
+                  <a:schemeClr val="tx1"/>
+                </a:solidFill>
+                <a:latin typeface="+mn-lt"/>
+                <a:ea typeface="+mn-ea"/>
+                <a:cs typeface="+mn-cs"/>
+              </a:defRPr>
+            </a:lvl3pPr>
+            <a:lvl4pPr marL="1371600" algn="l" defTabSz="914400" rtl="0" eaLnBrk="1" latinLnBrk="0" hangingPunct="1">
+              <a:defRPr sz="1800" kern="1200">
+                <a:solidFill>
+                  <a:schemeClr val="tx1"/>
+                </a:solidFill>
+                <a:latin typeface="+mn-lt"/>
+                <a:ea typeface="+mn-ea"/>
+                <a:cs typeface="+mn-cs"/>
+              </a:defRPr>
+            </a:lvl4pPr>
+            <a:lvl5pPr marL="1828800" algn="l" defTabSz="914400" rtl="0" eaLnBrk="1" latinLnBrk="0" hangingPunct="1">
+              <a:defRPr sz="1800" kern="1200">
+                <a:solidFill>
+                  <a:schemeClr val="tx1"/>
+                </a:solidFill>
+                <a:latin typeface="+mn-lt"/>
+                <a:ea typeface="+mn-ea"/>
+                <a:cs typeface="+mn-cs"/>
+              </a:defRPr>
+            </a:lvl5pPr>
+            <a:lvl6pPr marL="2286000" algn="l" defTabSz="914400" rtl="0" eaLnBrk="1" latinLnBrk="0" hangingPunct="1">
+              <a:defRPr sz="1800" kern="1200">
+                <a:solidFill>
+                  <a:schemeClr val="tx1"/>
+                </a:solidFill>
+                <a:latin typeface="+mn-lt"/>
+                <a:ea typeface="+mn-ea"/>
+                <a:cs typeface="+mn-cs"/>
+              </a:defRPr>
+            </a:lvl6pPr>
+            <a:lvl7pPr marL="2743200" algn="l" defTabSz="914400" rtl="0" eaLnBrk="1" latinLnBrk="0" hangingPunct="1">
+              <a:defRPr sz="1800" kern="1200">
+                <a:solidFill>
+                  <a:schemeClr val="tx1"/>
+                </a:solidFill>
+                <a:latin typeface="+mn-lt"/>
+                <a:ea typeface="+mn-ea"/>
+                <a:cs typeface="+mn-cs"/>
+              </a:defRPr>
+            </a:lvl7pPr>
+            <a:lvl8pPr marL="3200400" algn="l" defTabSz="914400" rtl="0" eaLnBrk="1" latinLnBrk="0" hangingPunct="1">
+              <a:defRPr sz="1800" kern="1200">
+                <a:solidFill>
+                  <a:schemeClr val="tx1"/>
+                </a:solidFill>
+                <a:latin typeface="+mn-lt"/>
+                <a:ea typeface="+mn-ea"/>
+                <a:cs typeface="+mn-cs"/>
+              </a:defRPr>
+            </a:lvl8pPr>
+            <a:lvl9pPr marL="3657600" algn="l" defTabSz="914400" rtl="0" eaLnBrk="1" latinLnBrk="0" hangingPunct="1">
+              <a:defRPr sz="1800" kern="1200">
+                <a:solidFill>
+                  <a:schemeClr val="tx1"/>
+                </a:solidFill>
+                <a:latin typeface="+mn-lt"/>
+                <a:ea typeface="+mn-ea"/>
+                <a:cs typeface="+mn-cs"/>
+              </a:defRPr>
+            </a:lvl9pPr>
+          </a:lstStyle>
+          <a:p>
+            <a:fld id="{104F53CC-0028-4916-8B93-0EBFFB2C7AAD}" type="slidenum">
+              <a:rPr lang="en-US" smtClean="0"/>
+              <a:pPr/>
+              <a:t>6</a:t>
+            </a:fld>
+            <a:endParaRPr lang="en-US" dirty="0"/>
+          </a:p>
+        </p:txBody>
+      </p:sp>
+      <p:sp>
+        <p:nvSpPr>
+          <p:cNvPr id="6" name="TextBox 5">
+            <a:extLst>
+              <a:ext uri="{FF2B5EF4-FFF2-40B4-BE49-F238E27FC236}">
+                <a16:creationId xmlns:a16="http://schemas.microsoft.com/office/drawing/2014/main" id="{687A746C-1A8B-4BDF-9F72-67F3F3093D7B}"/>
+              </a:ext>
+            </a:extLst>
+          </p:cNvPr>
+          <p:cNvSpPr txBox="1"/>
+          <p:nvPr/>
+        </p:nvSpPr>
+        <p:spPr>
+          <a:xfrm>
+            <a:off x="1680754" y="5860959"/>
+            <a:ext cx="10189818" cy="307777"/>
+          </a:xfrm>
+          <a:prstGeom prst="rect">
+            <a:avLst/>
+          </a:prstGeom>
+          <a:noFill/>
+        </p:spPr>
+        <p:txBody>
+          <a:bodyPr wrap="square" rtlCol="0">
+            <a:spAutoFit/>
+          </a:bodyPr>
+          <a:lstStyle/>
+          <a:p>
+            <a:pPr algn="r"/>
+            <a:r>
+              <a:rPr lang="de-DE" sz="1400" dirty="0"/>
+              <a:t>BRSKI-PRM: </a:t>
+            </a:r>
+            <a:r>
+              <a:rPr lang="en-US" sz="1400" dirty="0"/>
+              <a:t>BRSKI with Pledge in Responder Mode</a:t>
+            </a:r>
+            <a:r>
+              <a:rPr lang="de-DE" sz="1400" dirty="0"/>
+              <a:t> (draft-</a:t>
+            </a:r>
+            <a:r>
+              <a:rPr lang="de-DE" sz="1400" dirty="0" err="1"/>
+              <a:t>ietf</a:t>
+            </a:r>
+            <a:r>
+              <a:rPr lang="de-DE" sz="1400" dirty="0"/>
+              <a:t>-</a:t>
+            </a:r>
+            <a:r>
+              <a:rPr lang="de-DE" sz="1400" dirty="0" err="1"/>
+              <a:t>anima-brski-prm</a:t>
+            </a:r>
+            <a:r>
+              <a:rPr lang="de-DE" sz="1400" dirty="0"/>
+              <a:t>)</a:t>
+            </a:r>
+          </a:p>
+        </p:txBody>
+      </p:sp>
+    </p:spTree>
+    <p:extLst>
+      <p:ext uri="{BB962C8B-B14F-4D97-AF65-F5344CB8AC3E}">
+        <p14:creationId xmlns:p14="http://schemas.microsoft.com/office/powerpoint/2010/main" val="3091934840"/>
+      </p:ext>
+    </p:extLst>
+  </p:cSld>
+  <p:clrMapOvr>
+    <a:masterClrMapping/>
+  </p:clrMapOvr>
+</p:sld>
+</file>
+
+<file path=ppt/slides/slide7.xml><?xml version="1.0" encoding="utf-8"?>
+<p:sld xmlns:a="http://schemas.openxmlformats.org/drawingml/2006/main" xmlns:r="http://schemas.openxmlformats.org/officeDocument/2006/relationships" xmlns:p="http://schemas.openxmlformats.org/presentationml/2006/main">
+  <p:cSld>
+    <p:spTree>
+      <p:nvGrpSpPr>
+        <p:cNvPr id="1" name=""/>
+        <p:cNvGrpSpPr/>
+        <p:nvPr/>
+      </p:nvGrpSpPr>
+      <p:grpSpPr>
+        <a:xfrm>
+          <a:off x="0" y="0"/>
+          <a:ext cx="0" cy="0"/>
+          <a:chOff x="0" y="0"/>
+          <a:chExt cx="0" cy="0"/>
+        </a:xfrm>
+      </p:grpSpPr>
+      <p:sp>
+        <p:nvSpPr>
+          <p:cNvPr id="2" name="Title 1">
+            <a:extLst>
+              <a:ext uri="{FF2B5EF4-FFF2-40B4-BE49-F238E27FC236}">
+                <a16:creationId xmlns:a16="http://schemas.microsoft.com/office/drawing/2014/main" id="{67612D3D-95B0-4F74-BDB2-BCE058A01C12}"/>
+              </a:ext>
+            </a:extLst>
+          </p:cNvPr>
+          <p:cNvSpPr>
+            <a:spLocks noGrp="1"/>
+          </p:cNvSpPr>
+          <p:nvPr>
+            <p:ph type="title"/>
+          </p:nvPr>
+        </p:nvSpPr>
         <p:spPr>
           <a:xfrm>
             <a:off x="838200" y="539300"/>
@@ -6424,7 +6878,7 @@
         </p:nvSpPr>
         <p:spPr>
           <a:xfrm>
-            <a:off x="838200" y="2591984"/>
+            <a:off x="838200" y="2160665"/>
             <a:ext cx="10515600" cy="3042466"/>
           </a:xfrm>
         </p:spPr>
@@ -6462,6 +6916,14 @@
               <a:rPr lang="en-US" sz="2200" dirty="0"/>
               <a:t>PVR - Pledge voucher-request</a:t>
             </a:r>
+          </a:p>
+          <a:p>
+            <a:pPr>
+              <a:lnSpc>
+                <a:spcPct val="100000"/>
+              </a:lnSpc>
+            </a:pPr>
+            <a:endParaRPr lang="en-US" sz="2200" dirty="0"/>
           </a:p>
           <a:p>
             <a:pPr>
@@ -6619,7 +7081,7 @@
             <a:fld id="{8C792E63-5F21-4F54-A864-D84D9F273FCA}" type="datetimeFigureOut">
               <a:rPr lang="en-US" smtClean="0"/>
               <a:pPr/>
-              <a:t>3/3/2022</a:t>
+              <a:t>3/4/2022</a:t>
             </a:fld>
             <a:endParaRPr lang="en-US" dirty="0"/>
           </a:p>
@@ -6751,7 +7213,7 @@
             <a:fld id="{104F53CC-0028-4916-8B93-0EBFFB2C7AAD}" type="slidenum">
               <a:rPr lang="en-US" smtClean="0"/>
               <a:pPr/>
-              <a:t>6</a:t>
+              <a:t>7</a:t>
             </a:fld>
             <a:endParaRPr lang="en-US" dirty="0"/>
           </a:p>

</xml_diff>

<commit_message>
added figure references to A1, A2, A3 and "anima-jws-voucher.html#figure-4: Example Voucher Response" to slide 4 of ietf113-anima-jws-voucher.pptx
</commit_message>
<xml_diff>
--- a/presentations/ietf113-anima-jws-voucher.pptx
+++ b/presentations/ietf113-anima-jws-voucher.pptx
@@ -115,7 +115,18 @@
   </p:defaultTextStyle>
   <p:extLst>
     <p:ext uri="{EFAFB233-063F-42B5-8137-9DF3F51BA10A}">
-      <p15:sldGuideLst xmlns:p15="http://schemas.microsoft.com/office/powerpoint/2012/main"/>
+      <p15:sldGuideLst xmlns:p15="http://schemas.microsoft.com/office/powerpoint/2012/main">
+        <p15:guide id="1" orient="horz" pos="2160" userDrawn="1">
+          <p15:clr>
+            <a:srgbClr val="A4A3A4"/>
+          </p15:clr>
+        </p15:guide>
+        <p15:guide id="2" pos="3840" userDrawn="1">
+          <p15:clr>
+            <a:srgbClr val="A4A3A4"/>
+          </p15:clr>
+        </p15:guide>
+      </p15:sldGuideLst>
     </p:ext>
   </p:extLst>
 </p:presentation>
@@ -229,7 +240,7 @@
           <a:p>
             <a:fld id="{33B5B5E8-CA78-4A82-83A0-867EF5A818AE}" type="datetimeFigureOut">
               <a:rPr lang="en-US" smtClean="0"/>
-              <a:t>3/4/2022</a:t>
+              <a:t>3/7/2022</a:t>
             </a:fld>
             <a:endParaRPr lang="en-US"/>
           </a:p>
@@ -1155,7 +1166,7 @@
           <a:p>
             <a:fld id="{8C792E63-5F21-4F54-A864-D84D9F273FCA}" type="datetimeFigureOut">
               <a:rPr lang="en-US" smtClean="0"/>
-              <a:t>3/4/2022</a:t>
+              <a:t>3/7/2022</a:t>
             </a:fld>
             <a:endParaRPr lang="en-US" dirty="0"/>
           </a:p>
@@ -1373,7 +1384,7 @@
           <a:p>
             <a:fld id="{8C792E63-5F21-4F54-A864-D84D9F273FCA}" type="datetimeFigureOut">
               <a:rPr lang="en-US" smtClean="0"/>
-              <a:t>3/4/2022</a:t>
+              <a:t>3/7/2022</a:t>
             </a:fld>
             <a:endParaRPr lang="en-US"/>
           </a:p>
@@ -1597,7 +1608,7 @@
           <a:p>
             <a:fld id="{8C792E63-5F21-4F54-A864-D84D9F273FCA}" type="datetimeFigureOut">
               <a:rPr lang="en-US" smtClean="0"/>
-              <a:t>3/4/2022</a:t>
+              <a:t>3/7/2022</a:t>
             </a:fld>
             <a:endParaRPr lang="en-US"/>
           </a:p>
@@ -1811,7 +1822,7 @@
           <a:p>
             <a:fld id="{8C792E63-5F21-4F54-A864-D84D9F273FCA}" type="datetimeFigureOut">
               <a:rPr lang="en-US" smtClean="0"/>
-              <a:t>3/4/2022</a:t>
+              <a:t>3/7/2022</a:t>
             </a:fld>
             <a:endParaRPr lang="en-US"/>
           </a:p>
@@ -2102,7 +2113,7 @@
           <a:p>
             <a:fld id="{8C792E63-5F21-4F54-A864-D84D9F273FCA}" type="datetimeFigureOut">
               <a:rPr lang="en-US" smtClean="0"/>
-              <a:t>3/4/2022</a:t>
+              <a:t>3/7/2022</a:t>
             </a:fld>
             <a:endParaRPr lang="en-US"/>
           </a:p>
@@ -2383,7 +2394,7 @@
           <a:p>
             <a:fld id="{8C792E63-5F21-4F54-A864-D84D9F273FCA}" type="datetimeFigureOut">
               <a:rPr lang="en-US" smtClean="0"/>
-              <a:t>3/4/2022</a:t>
+              <a:t>3/7/2022</a:t>
             </a:fld>
             <a:endParaRPr lang="en-US"/>
           </a:p>
@@ -2811,7 +2822,7 @@
           <a:p>
             <a:fld id="{8C792E63-5F21-4F54-A864-D84D9F273FCA}" type="datetimeFigureOut">
               <a:rPr lang="en-US" smtClean="0"/>
-              <a:t>3/4/2022</a:t>
+              <a:t>3/7/2022</a:t>
             </a:fld>
             <a:endParaRPr lang="en-US"/>
           </a:p>
@@ -2968,7 +2979,7 @@
           <a:p>
             <a:fld id="{8C792E63-5F21-4F54-A864-D84D9F273FCA}" type="datetimeFigureOut">
               <a:rPr lang="en-US" smtClean="0"/>
-              <a:t>3/4/2022</a:t>
+              <a:t>3/7/2022</a:t>
             </a:fld>
             <a:endParaRPr lang="en-US"/>
           </a:p>
@@ -3097,7 +3108,7 @@
           <a:p>
             <a:fld id="{8C792E63-5F21-4F54-A864-D84D9F273FCA}" type="datetimeFigureOut">
               <a:rPr lang="en-US" smtClean="0"/>
-              <a:t>3/4/2022</a:t>
+              <a:t>3/7/2022</a:t>
             </a:fld>
             <a:endParaRPr lang="en-US"/>
           </a:p>
@@ -3424,7 +3435,7 @@
           <a:p>
             <a:fld id="{8C792E63-5F21-4F54-A864-D84D9F273FCA}" type="datetimeFigureOut">
               <a:rPr lang="en-US" smtClean="0"/>
-              <a:t>3/4/2022</a:t>
+              <a:t>3/7/2022</a:t>
             </a:fld>
             <a:endParaRPr lang="en-US"/>
           </a:p>
@@ -3728,7 +3739,7 @@
           <a:p>
             <a:fld id="{8C792E63-5F21-4F54-A864-D84D9F273FCA}" type="datetimeFigureOut">
               <a:rPr lang="en-US" smtClean="0"/>
-              <a:t>3/4/2022</a:t>
+              <a:t>3/7/2022</a:t>
             </a:fld>
             <a:endParaRPr lang="en-US"/>
           </a:p>
@@ -4020,7 +4031,7 @@
           <a:p>
             <a:fld id="{8C792E63-5F21-4F54-A864-D84D9F273FCA}" type="datetimeFigureOut">
               <a:rPr lang="en-US" smtClean="0"/>
-              <a:t>3/4/2022</a:t>
+              <a:t>3/7/2022</a:t>
             </a:fld>
             <a:endParaRPr lang="en-US"/>
           </a:p>
@@ -4800,7 +4811,7 @@
             <a:fld id="{8C792E63-5F21-4F54-A864-D84D9F273FCA}" type="datetimeFigureOut">
               <a:rPr lang="en-US" smtClean="0"/>
               <a:pPr/>
-              <a:t>3/4/2022</a:t>
+              <a:t>3/7/2022</a:t>
             </a:fld>
             <a:endParaRPr lang="en-US"/>
           </a:p>
@@ -5403,7 +5414,7 @@
             <a:fld id="{8C792E63-5F21-4F54-A864-D84D9F273FCA}" type="datetimeFigureOut">
               <a:rPr lang="en-US" smtClean="0"/>
               <a:pPr/>
-              <a:t>3/4/2022</a:t>
+              <a:t>3/7/2022</a:t>
             </a:fld>
             <a:endParaRPr lang="en-US" dirty="0"/>
           </a:p>
@@ -5604,7 +5615,7 @@
             </a:br>
             <a:r>
               <a:rPr lang="en-US" sz="3600" b="1" dirty="0"/>
-              <a:t>General JWS JSON Serialization Syntax</a:t>
+              <a:t>General JWS JSON Serialization syntax and example</a:t>
             </a:r>
           </a:p>
         </p:txBody>
@@ -5735,7 +5746,7 @@
             <a:fld id="{8C792E63-5F21-4F54-A864-D84D9F273FCA}" type="datetimeFigureOut">
               <a:rPr lang="en-US" smtClean="0"/>
               <a:pPr/>
-              <a:t>3/4/2022</a:t>
+              <a:t>3/7/2022</a:t>
             </a:fld>
             <a:endParaRPr lang="en-US" dirty="0"/>
           </a:p>
@@ -5875,10 +5886,10 @@
       </p:sp>
       <p:pic>
         <p:nvPicPr>
-          <p:cNvPr id="7" name="Picture 6">
-            <a:extLst>
-              <a:ext uri="{FF2B5EF4-FFF2-40B4-BE49-F238E27FC236}">
-                <a16:creationId xmlns:a16="http://schemas.microsoft.com/office/drawing/2014/main" id="{3B6AAB72-327F-4C01-8ACB-A29BBCAE08FB}"/>
+          <p:cNvPr id="6" name="Picture 5">
+            <a:extLst>
+              <a:ext uri="{FF2B5EF4-FFF2-40B4-BE49-F238E27FC236}">
+                <a16:creationId xmlns:a16="http://schemas.microsoft.com/office/drawing/2014/main" id="{B1840F86-F06D-4C23-9167-BD8B97E31234}"/>
               </a:ext>
             </a:extLst>
           </p:cNvPr>
@@ -5895,14 +5906,186 @@
         </p:blipFill>
         <p:spPr>
           <a:xfrm>
-            <a:off x="2763672" y="1519514"/>
-            <a:ext cx="6631342" cy="4779346"/>
+            <a:off x="628130" y="1621061"/>
+            <a:ext cx="5257801" cy="4242923"/>
           </a:xfrm>
           <a:prstGeom prst="rect">
             <a:avLst/>
           </a:prstGeom>
         </p:spPr>
       </p:pic>
+      <p:pic>
+        <p:nvPicPr>
+          <p:cNvPr id="9" name="Picture 8">
+            <a:extLst>
+              <a:ext uri="{FF2B5EF4-FFF2-40B4-BE49-F238E27FC236}">
+                <a16:creationId xmlns:a16="http://schemas.microsoft.com/office/drawing/2014/main" id="{83C1A3CE-94E3-41F9-A0AC-11217F2F2913}"/>
+              </a:ext>
+            </a:extLst>
+          </p:cNvPr>
+          <p:cNvPicPr>
+            <a:picLocks noChangeAspect="1"/>
+          </p:cNvPicPr>
+          <p:nvPr/>
+        </p:nvPicPr>
+        <p:blipFill>
+          <a:blip r:embed="rId4"/>
+          <a:stretch>
+            <a:fillRect/>
+          </a:stretch>
+        </p:blipFill>
+        <p:spPr>
+          <a:xfrm>
+            <a:off x="6828379" y="2771144"/>
+            <a:ext cx="4998791" cy="2111989"/>
+          </a:xfrm>
+          <a:prstGeom prst="rect">
+            <a:avLst/>
+          </a:prstGeom>
+        </p:spPr>
+      </p:pic>
+      <p:sp>
+        <p:nvSpPr>
+          <p:cNvPr id="10" name="Arrow: Chevron 9">
+            <a:extLst>
+              <a:ext uri="{FF2B5EF4-FFF2-40B4-BE49-F238E27FC236}">
+                <a16:creationId xmlns:a16="http://schemas.microsoft.com/office/drawing/2014/main" id="{33A0AB20-5AAD-4D34-90CE-6DB3FB7E033B}"/>
+              </a:ext>
+            </a:extLst>
+          </p:cNvPr>
+          <p:cNvSpPr/>
+          <p:nvPr/>
+        </p:nvSpPr>
+        <p:spPr>
+          <a:xfrm>
+            <a:off x="5885932" y="1631082"/>
+            <a:ext cx="941334" cy="4232902"/>
+          </a:xfrm>
+          <a:prstGeom prst="chevron">
+            <a:avLst/>
+          </a:prstGeom>
+          <a:solidFill>
+            <a:schemeClr val="bg2"/>
+          </a:solidFill>
+          <a:ln>
+            <a:solidFill>
+              <a:schemeClr val="bg2">
+                <a:lumMod val="50000"/>
+              </a:schemeClr>
+            </a:solidFill>
+          </a:ln>
+        </p:spPr>
+        <p:style>
+          <a:lnRef idx="2">
+            <a:schemeClr val="accent1">
+              <a:shade val="50000"/>
+            </a:schemeClr>
+          </a:lnRef>
+          <a:fillRef idx="1">
+            <a:schemeClr val="accent1"/>
+          </a:fillRef>
+          <a:effectRef idx="0">
+            <a:schemeClr val="accent1"/>
+          </a:effectRef>
+          <a:fontRef idx="minor">
+            <a:schemeClr val="lt1"/>
+          </a:fontRef>
+        </p:style>
+        <p:txBody>
+          <a:bodyPr rtlCol="0" anchor="ctr"/>
+          <a:lstStyle/>
+          <a:p>
+            <a:pPr algn="ctr"/>
+            <a:endParaRPr lang="en-US">
+              <a:solidFill>
+                <a:schemeClr val="tx1"/>
+              </a:solidFill>
+            </a:endParaRPr>
+          </a:p>
+        </p:txBody>
+      </p:sp>
+      <p:sp>
+        <p:nvSpPr>
+          <p:cNvPr id="11" name="TextBox 10">
+            <a:extLst>
+              <a:ext uri="{FF2B5EF4-FFF2-40B4-BE49-F238E27FC236}">
+                <a16:creationId xmlns:a16="http://schemas.microsoft.com/office/drawing/2014/main" id="{66800C0B-1E7A-4C08-AC82-0D322786FFD6}"/>
+              </a:ext>
+            </a:extLst>
+          </p:cNvPr>
+          <p:cNvSpPr txBox="1"/>
+          <p:nvPr/>
+        </p:nvSpPr>
+        <p:spPr>
+          <a:xfrm>
+            <a:off x="6827266" y="5908432"/>
+            <a:ext cx="4302369" cy="523220"/>
+          </a:xfrm>
+          <a:prstGeom prst="rect">
+            <a:avLst/>
+          </a:prstGeom>
+          <a:noFill/>
+        </p:spPr>
+        <p:txBody>
+          <a:bodyPr wrap="square" rtlCol="0">
+            <a:spAutoFit/>
+          </a:bodyPr>
+          <a:lstStyle/>
+          <a:p>
+            <a:r>
+              <a:rPr lang="en-US" sz="1400" dirty="0"/>
+              <a:t>anima-jws-voucher.html#figure-4:</a:t>
+            </a:r>
+          </a:p>
+          <a:p>
+            <a:r>
+              <a:rPr lang="en-US" sz="1400" dirty="0"/>
+              <a:t>Example Voucher Response</a:t>
+            </a:r>
+          </a:p>
+        </p:txBody>
+      </p:sp>
+      <p:sp>
+        <p:nvSpPr>
+          <p:cNvPr id="12" name="TextBox 11">
+            <a:extLst>
+              <a:ext uri="{FF2B5EF4-FFF2-40B4-BE49-F238E27FC236}">
+                <a16:creationId xmlns:a16="http://schemas.microsoft.com/office/drawing/2014/main" id="{6A699D1E-6C3B-4DE4-AFFE-29BB1B384CBC}"/>
+              </a:ext>
+            </a:extLst>
+          </p:cNvPr>
+          <p:cNvSpPr txBox="1"/>
+          <p:nvPr/>
+        </p:nvSpPr>
+        <p:spPr>
+          <a:xfrm>
+            <a:off x="636841" y="5908433"/>
+            <a:ext cx="5323232" cy="523220"/>
+          </a:xfrm>
+          <a:prstGeom prst="rect">
+            <a:avLst/>
+          </a:prstGeom>
+          <a:noFill/>
+        </p:spPr>
+        <p:txBody>
+          <a:bodyPr wrap="square" rtlCol="0">
+            <a:spAutoFit/>
+          </a:bodyPr>
+          <a:lstStyle/>
+          <a:p>
+            <a:r>
+              <a:rPr lang="en-US" sz="1400" dirty="0"/>
+              <a:t>anima-jws-voucher.html#figure-1:</a:t>
+            </a:r>
+          </a:p>
+          <a:p>
+            <a:r>
+              <a:rPr lang="en-US" sz="1400" dirty="0"/>
+              <a:t>Voucher Representation in General JWS JSON Serialization Syntax</a:t>
+            </a:r>
+          </a:p>
+        </p:txBody>
+      </p:sp>
     </p:spTree>
     <p:extLst>
       <p:ext uri="{BB962C8B-B14F-4D97-AF65-F5344CB8AC3E}">
@@ -6179,7 +6362,7 @@
             <a:fld id="{8C792E63-5F21-4F54-A864-D84D9F273FCA}" type="datetimeFigureOut">
               <a:rPr lang="en-US" smtClean="0"/>
               <a:pPr/>
-              <a:t>3/4/2022</a:t>
+              <a:t>3/7/2022</a:t>
             </a:fld>
             <a:endParaRPr lang="en-US" dirty="0"/>
           </a:p>
@@ -6597,7 +6780,7 @@
             <a:fld id="{8C792E63-5F21-4F54-A864-D84D9F273FCA}" type="datetimeFigureOut">
               <a:rPr lang="en-US" smtClean="0"/>
               <a:pPr/>
-              <a:t>3/4/2022</a:t>
+              <a:t>3/7/2022</a:t>
             </a:fld>
             <a:endParaRPr lang="en-US" dirty="0"/>
           </a:p>
@@ -7081,7 +7264,7 @@
             <a:fld id="{8C792E63-5F21-4F54-A864-D84D9F273FCA}" type="datetimeFigureOut">
               <a:rPr lang="en-US" smtClean="0"/>
               <a:pPr/>
-              <a:t>3/4/2022</a:t>
+              <a:t>3/7/2022</a:t>
             </a:fld>
             <a:endParaRPr lang="en-US" dirty="0"/>
           </a:p>

</xml_diff>

<commit_message>
draft-ietf-anima-jws-voucher-03, updated draft version in pptx
</commit_message>
<xml_diff>
--- a/presentations/ietf113-anima-jws-voucher.pptx
+++ b/presentations/ietf113-anima-jws-voucher.pptx
@@ -4476,9 +4476,10 @@
           <a:lstStyle/>
           <a:p>
             <a:r>
-              <a:rPr lang="en-US" sz="2800" dirty="0"/>
-              <a:t>draft-ietf-anima-jws-voucher-02</a:t>
-            </a:r>
+              <a:rPr lang="en-US" sz="2800"/>
+              <a:t>draft-ietf-anima-jws-voucher-03</a:t>
+            </a:r>
+            <a:endParaRPr lang="en-US" sz="2800" dirty="0"/>
           </a:p>
           <a:p>
             <a:endParaRPr lang="en-US" sz="2000" dirty="0"/>
@@ -6147,7 +6148,7 @@
             <a:pPr algn="ctr"/>
             <a:r>
               <a:rPr lang="en-US" sz="3600" b="1" dirty="0"/>
-              <a:t>History of changes - draft-ietf-anima-jws-voucher-02</a:t>
+              <a:t>History of changes - draft-ietf-anima-jws-voucher-03</a:t>
             </a:r>
           </a:p>
         </p:txBody>

</xml_diff>